<commit_message>
added git clone https link
</commit_message>
<xml_diff>
--- a/running-jobs-at-chpc.pptx
+++ b/running-jobs-at-chpc.pptx
@@ -336,7 +336,7 @@
           <a:p>
             <a:fld id="{62E2CED9-D5BD-3644-8475-2841E9D82073}" type="datetime1">
               <a:rPr lang="en-US" smtClean="0"/>
-              <a:t>8/19/24</a:t>
+              <a:t>8/20/24</a:t>
             </a:fld>
             <a:endParaRPr lang="en-US"/>
           </a:p>
@@ -581,7 +581,7 @@
           <a:p>
             <a:fld id="{31221515-87E2-7C40-8A70-6FFA423A8160}" type="datetime1">
               <a:rPr lang="en-US" smtClean="0"/>
-              <a:t>8/19/24</a:t>
+              <a:t>8/20/24</a:t>
             </a:fld>
             <a:endParaRPr lang="en-US"/>
           </a:p>
@@ -1088,7 +1088,7 @@
           <a:p>
             <a:fld id="{2BB4CB58-B347-5B4D-9C8E-5A887AD7F3E7}" type="datetime1">
               <a:rPr lang="en-US" smtClean="0"/>
-              <a:t>8/19/24</a:t>
+              <a:t>8/20/24</a:t>
             </a:fld>
             <a:endParaRPr lang="en-US"/>
           </a:p>
@@ -1271,7 +1271,7 @@
           <a:p>
             <a:fld id="{6D1C50CE-E2FB-F04B-AEA0-39B24230EA52}" type="datetime1">
               <a:rPr lang="en-US" smtClean="0"/>
-              <a:t>8/19/24</a:t>
+              <a:t>8/20/24</a:t>
             </a:fld>
             <a:endParaRPr lang="en-US"/>
           </a:p>
@@ -1374,7 +1374,7 @@
           <a:p>
             <a:fld id="{2BB4CB58-B347-5B4D-9C8E-5A887AD7F3E7}" type="datetime1">
               <a:rPr lang="en-US" smtClean="0"/>
-              <a:t>8/19/24</a:t>
+              <a:t>8/20/24</a:t>
             </a:fld>
             <a:endParaRPr lang="en-US"/>
           </a:p>
@@ -1524,7 +1524,7 @@
           <a:p>
             <a:fld id="{2BB4CB58-B347-5B4D-9C8E-5A887AD7F3E7}" type="datetime1">
               <a:rPr lang="en-US" smtClean="0"/>
-              <a:t>8/19/24</a:t>
+              <a:t>8/20/24</a:t>
             </a:fld>
             <a:endParaRPr lang="en-US"/>
           </a:p>
@@ -1674,7 +1674,7 @@
           <a:p>
             <a:fld id="{2BB4CB58-B347-5B4D-9C8E-5A887AD7F3E7}" type="datetime1">
               <a:rPr lang="en-US" smtClean="0"/>
-              <a:t>8/19/24</a:t>
+              <a:t>8/20/24</a:t>
             </a:fld>
             <a:endParaRPr lang="en-US"/>
           </a:p>
@@ -1824,7 +1824,7 @@
           <a:p>
             <a:fld id="{2BB4CB58-B347-5B4D-9C8E-5A887AD7F3E7}" type="datetime1">
               <a:rPr lang="en-US" smtClean="0"/>
-              <a:t>8/19/24</a:t>
+              <a:t>8/20/24</a:t>
             </a:fld>
             <a:endParaRPr lang="en-US"/>
           </a:p>
@@ -1974,7 +1974,7 @@
           <a:p>
             <a:fld id="{2BB4CB58-B347-5B4D-9C8E-5A887AD7F3E7}" type="datetime1">
               <a:rPr lang="en-US" smtClean="0"/>
-              <a:t>8/19/24</a:t>
+              <a:t>8/20/24</a:t>
             </a:fld>
             <a:endParaRPr lang="en-US"/>
           </a:p>
@@ -2124,7 +2124,7 @@
           <a:p>
             <a:fld id="{2BB4CB58-B347-5B4D-9C8E-5A887AD7F3E7}" type="datetime1">
               <a:rPr lang="en-US" smtClean="0"/>
-              <a:t>8/19/24</a:t>
+              <a:t>8/20/24</a:t>
             </a:fld>
             <a:endParaRPr lang="en-US"/>
           </a:p>
@@ -2274,7 +2274,7 @@
           <a:p>
             <a:fld id="{2BB4CB58-B347-5B4D-9C8E-5A887AD7F3E7}" type="datetime1">
               <a:rPr lang="en-US" smtClean="0"/>
-              <a:t>8/19/24</a:t>
+              <a:t>8/20/24</a:t>
             </a:fld>
             <a:endParaRPr lang="en-US"/>
           </a:p>
@@ -2424,7 +2424,7 @@
           <a:p>
             <a:fld id="{2BB4CB58-B347-5B4D-9C8E-5A887AD7F3E7}" type="datetime1">
               <a:rPr lang="en-US" smtClean="0"/>
-              <a:t>8/19/24</a:t>
+              <a:t>8/20/24</a:t>
             </a:fld>
             <a:endParaRPr lang="en-US"/>
           </a:p>
@@ -2682,7 +2682,7 @@
           <a:p>
             <a:fld id="{2BB4CB58-B347-5B4D-9C8E-5A887AD7F3E7}" type="datetime1">
               <a:rPr lang="en-US" smtClean="0"/>
-              <a:t>8/19/24</a:t>
+              <a:t>8/20/24</a:t>
             </a:fld>
             <a:endParaRPr lang="en-US"/>
           </a:p>
@@ -2875,7 +2875,7 @@
           <a:p>
             <a:fld id="{731A72B3-DD96-E04B-8B14-D43AA4AE89BB}" type="datetime1">
               <a:rPr lang="en-US" smtClean="0"/>
-              <a:t>8/19/24</a:t>
+              <a:t>8/20/24</a:t>
             </a:fld>
             <a:endParaRPr lang="en-US"/>
           </a:p>
@@ -3084,7 +3084,7 @@
           <a:p>
             <a:fld id="{2BB4CB58-B347-5B4D-9C8E-5A887AD7F3E7}" type="datetime1">
               <a:rPr lang="en-US" smtClean="0"/>
-              <a:t>8/19/24</a:t>
+              <a:t>8/20/24</a:t>
             </a:fld>
             <a:endParaRPr lang="en-US"/>
           </a:p>
@@ -3259,7 +3259,7 @@
           <a:p>
             <a:fld id="{2BB4CB58-B347-5B4D-9C8E-5A887AD7F3E7}" type="datetime1">
               <a:rPr lang="en-US" smtClean="0"/>
-              <a:t>8/19/24</a:t>
+              <a:t>8/20/24</a:t>
             </a:fld>
             <a:endParaRPr lang="en-US"/>
           </a:p>
@@ -3409,7 +3409,7 @@
           <a:p>
             <a:fld id="{2BB4CB58-B347-5B4D-9C8E-5A887AD7F3E7}" type="datetime1">
               <a:rPr lang="en-US" smtClean="0"/>
-              <a:t>8/19/24</a:t>
+              <a:t>8/20/24</a:t>
             </a:fld>
             <a:endParaRPr lang="en-US"/>
           </a:p>
@@ -3562,7 +3562,7 @@
           <a:p>
             <a:fld id="{2BB4CB58-B347-5B4D-9C8E-5A887AD7F3E7}" type="datetime1">
               <a:rPr lang="en-US" smtClean="0"/>
-              <a:t>8/19/24</a:t>
+              <a:t>8/20/24</a:t>
             </a:fld>
             <a:endParaRPr lang="en-US"/>
           </a:p>
@@ -3731,7 +3731,7 @@
           <a:p>
             <a:fld id="{2BB4CB58-B347-5B4D-9C8E-5A887AD7F3E7}" type="datetime1">
               <a:rPr lang="en-US" smtClean="0"/>
-              <a:t>8/19/24</a:t>
+              <a:t>8/20/24</a:t>
             </a:fld>
             <a:endParaRPr lang="en-US"/>
           </a:p>
@@ -3895,7 +3895,7 @@
           <a:p>
             <a:fld id="{2BB4CB58-B347-5B4D-9C8E-5A887AD7F3E7}" type="datetime1">
               <a:rPr lang="en-US" smtClean="0"/>
-              <a:t>8/19/24</a:t>
+              <a:t>8/20/24</a:t>
             </a:fld>
             <a:endParaRPr lang="en-US"/>
           </a:p>
@@ -4088,7 +4088,7 @@
           <a:p>
             <a:fld id="{6C81A55C-D3F3-414F-ACAE-23B92BAD237C}" type="datetime1">
               <a:rPr lang="en-US" smtClean="0"/>
-              <a:t>8/19/24</a:t>
+              <a:t>8/20/24</a:t>
             </a:fld>
             <a:endParaRPr lang="en-US"/>
           </a:p>
@@ -4221,7 +4221,7 @@
           <a:p>
             <a:fld id="{6C81A55C-D3F3-414F-ACAE-23B92BAD237C}" type="datetime1">
               <a:rPr lang="en-US" smtClean="0"/>
-              <a:t>8/19/24</a:t>
+              <a:t>8/20/24</a:t>
             </a:fld>
             <a:endParaRPr lang="en-US"/>
           </a:p>
@@ -4324,7 +4324,7 @@
           <a:p>
             <a:fld id="{279B7796-27FF-2447-A144-C38BBB0049E9}" type="datetime1">
               <a:rPr lang="en-US" smtClean="0"/>
-              <a:t>8/19/24</a:t>
+              <a:t>8/20/24</a:t>
             </a:fld>
             <a:endParaRPr lang="en-US"/>
           </a:p>
@@ -4501,7 +4501,7 @@
           <a:p>
             <a:fld id="{6C81A55C-D3F3-414F-ACAE-23B92BAD237C}" type="datetime1">
               <a:rPr lang="en-US" smtClean="0"/>
-              <a:t>8/19/24</a:t>
+              <a:t>8/20/24</a:t>
             </a:fld>
             <a:endParaRPr lang="en-US"/>
           </a:p>
@@ -5603,7 +5603,7 @@
           <a:p>
             <a:fld id="{6D1C50CE-E2FB-F04B-AEA0-39B24230EA52}" type="datetime1">
               <a:rPr lang="en-US" smtClean="0"/>
-              <a:t>8/19/24</a:t>
+              <a:t>8/20/24</a:t>
             </a:fld>
             <a:endParaRPr lang="en-US"/>
           </a:p>
@@ -6030,7 +6030,7 @@
           <a:p>
             <a:fld id="{EA19B2C9-D816-8745-9B75-224A39CD4194}" type="datetime1">
               <a:rPr lang="en-US" smtClean="0"/>
-              <a:t>8/19/24</a:t>
+              <a:t>8/20/24</a:t>
             </a:fld>
             <a:endParaRPr lang="en-US"/>
           </a:p>
@@ -6180,7 +6180,7 @@
           <a:p>
             <a:fld id="{EA19B2C9-D816-8745-9B75-224A39CD4194}" type="datetime1">
               <a:rPr lang="en-US" smtClean="0"/>
-              <a:t>8/19/24</a:t>
+              <a:t>8/20/24</a:t>
             </a:fld>
             <a:endParaRPr lang="en-US"/>
           </a:p>
@@ -6330,7 +6330,7 @@
           <a:p>
             <a:fld id="{EA19B2C9-D816-8745-9B75-224A39CD4194}" type="datetime1">
               <a:rPr lang="en-US" smtClean="0"/>
-              <a:t>8/19/24</a:t>
+              <a:t>8/20/24</a:t>
             </a:fld>
             <a:endParaRPr lang="en-US"/>
           </a:p>
@@ -6480,7 +6480,7 @@
           <a:p>
             <a:fld id="{EA19B2C9-D816-8745-9B75-224A39CD4194}" type="datetime1">
               <a:rPr lang="en-US" smtClean="0"/>
-              <a:t>8/19/24</a:t>
+              <a:t>8/20/24</a:t>
             </a:fld>
             <a:endParaRPr lang="en-US"/>
           </a:p>
@@ -6630,7 +6630,7 @@
           <a:p>
             <a:fld id="{EA19B2C9-D816-8745-9B75-224A39CD4194}" type="datetime1">
               <a:rPr lang="en-US" smtClean="0"/>
-              <a:t>8/19/24</a:t>
+              <a:t>8/20/24</a:t>
             </a:fld>
             <a:endParaRPr lang="en-US"/>
           </a:p>
@@ -6888,7 +6888,7 @@
           <a:p>
             <a:fld id="{EA19B2C9-D816-8745-9B75-224A39CD4194}" type="datetime1">
               <a:rPr lang="en-US" smtClean="0"/>
-              <a:t>8/19/24</a:t>
+              <a:t>8/20/24</a:t>
             </a:fld>
             <a:endParaRPr lang="en-US"/>
           </a:p>
@@ -7068,7 +7068,7 @@
           <a:p>
             <a:fld id="{6D1C50CE-E2FB-F04B-AEA0-39B24230EA52}" type="datetime1">
               <a:rPr lang="en-US" smtClean="0"/>
-              <a:t>8/19/24</a:t>
+              <a:t>8/20/24</a:t>
             </a:fld>
             <a:endParaRPr lang="en-US"/>
           </a:p>
@@ -7171,7 +7171,7 @@
           <a:p>
             <a:fld id="{EA19B2C9-D816-8745-9B75-224A39CD4194}" type="datetime1">
               <a:rPr lang="en-US" smtClean="0"/>
-              <a:t>8/19/24</a:t>
+              <a:t>8/20/24</a:t>
             </a:fld>
             <a:endParaRPr lang="en-US"/>
           </a:p>
@@ -7321,7 +7321,7 @@
           <a:p>
             <a:fld id="{EA19B2C9-D816-8745-9B75-224A39CD4194}" type="datetime1">
               <a:rPr lang="en-US" smtClean="0"/>
-              <a:t>8/19/24</a:t>
+              <a:t>8/20/24</a:t>
             </a:fld>
             <a:endParaRPr lang="en-US"/>
           </a:p>
@@ -7471,7 +7471,7 @@
           <a:p>
             <a:fld id="{63FD9185-AD24-9B42-A0B5-54F9817CCCB7}" type="datetime1">
               <a:rPr lang="en-US" smtClean="0"/>
-              <a:t>8/19/24</a:t>
+              <a:t>8/20/24</a:t>
             </a:fld>
             <a:endParaRPr lang="en-US"/>
           </a:p>
@@ -7621,7 +7621,7 @@
           <a:p>
             <a:fld id="{FCD69FAF-FB69-C34E-8B9C-EFFFE36E46A2}" type="datetime1">
               <a:rPr lang="en-US" smtClean="0"/>
-              <a:t>8/19/24</a:t>
+              <a:t>8/20/24</a:t>
             </a:fld>
             <a:endParaRPr lang="en-US"/>
           </a:p>
@@ -7807,7 +7807,7 @@
           <a:p>
             <a:fld id="{31221515-87E2-7C40-8A70-6FFA423A8160}" type="datetime1">
               <a:rPr lang="en-US" smtClean="0"/>
-              <a:t>8/19/24</a:t>
+              <a:t>8/20/24</a:t>
             </a:fld>
             <a:endParaRPr lang="en-US"/>
           </a:p>
@@ -7940,7 +7940,7 @@
           <a:p>
             <a:fld id="{31221515-87E2-7C40-8A70-6FFA423A8160}" type="datetime1">
               <a:rPr lang="en-US" smtClean="0"/>
-              <a:t>8/19/24</a:t>
+              <a:t>8/20/24</a:t>
             </a:fld>
             <a:endParaRPr lang="en-US"/>
           </a:p>
@@ -8151,7 +8151,7 @@
           <a:p>
             <a:fld id="{2BB4CB58-B347-5B4D-9C8E-5A887AD7F3E7}" type="datetime1">
               <a:rPr lang="en-US" smtClean="0"/>
-              <a:t>8/19/24</a:t>
+              <a:t>8/20/24</a:t>
             </a:fld>
             <a:endParaRPr lang="en-US"/>
           </a:p>
@@ -8458,7 +8458,7 @@
           <a:p>
             <a:fld id="{55D5EE7A-2F0B-F045-A3C5-943ACEC06F73}" type="datetime1">
               <a:rPr lang="en-US" smtClean="0"/>
-              <a:t>8/19/24</a:t>
+              <a:t>8/20/24</a:t>
             </a:fld>
             <a:endParaRPr lang="en-US"/>
           </a:p>
@@ -8656,7 +8656,7 @@
           <a:p>
             <a:fld id="{085B8D5C-F4EF-B649-B365-9A4DB83B2496}" type="datetime1">
               <a:rPr lang="en-US" smtClean="0"/>
-              <a:t>8/19/24</a:t>
+              <a:t>8/20/24</a:t>
             </a:fld>
             <a:endParaRPr lang="en-US"/>
           </a:p>
@@ -8854,7 +8854,7 @@
           <a:p>
             <a:fld id="{3DA9B093-FC82-AE41-AF04-D2D7DA79C7A2}" type="datetime1">
               <a:rPr lang="en-US" smtClean="0"/>
-              <a:t>8/19/24</a:t>
+              <a:t>8/20/24</a:t>
             </a:fld>
             <a:endParaRPr lang="en-US"/>
           </a:p>
@@ -9042,7 +9042,7 @@
           <a:p>
             <a:fld id="{8DF81612-102D-4C42-A0F0-339BF18A2360}" type="datetime1">
               <a:rPr lang="en-US" smtClean="0"/>
-              <a:t>8/19/24</a:t>
+              <a:t>8/20/24</a:t>
             </a:fld>
             <a:endParaRPr lang="en-US"/>
           </a:p>
@@ -9253,7 +9253,7 @@
           <a:p>
             <a:fld id="{3E98D671-C5DA-AF46-84EF-749DA99440AB}" type="datetime1">
               <a:rPr lang="en-US" smtClean="0"/>
-              <a:t>8/19/24</a:t>
+              <a:t>8/20/24</a:t>
             </a:fld>
             <a:endParaRPr lang="en-US"/>
           </a:p>
@@ -9558,7 +9558,7 @@
           <a:p>
             <a:fld id="{95C48D57-3857-6F44-9A5B-F3531645B419}" type="datetime1">
               <a:rPr lang="en-US" smtClean="0"/>
-              <a:t>8/19/24</a:t>
+              <a:t>8/20/24</a:t>
             </a:fld>
             <a:endParaRPr lang="en-US"/>
           </a:p>
@@ -10002,7 +10002,7 @@
           <a:p>
             <a:fld id="{D7B5D516-3E61-FC47-B3EE-AEB5B493CC2D}" type="datetime1">
               <a:rPr lang="en-US" smtClean="0"/>
-              <a:t>8/19/24</a:t>
+              <a:t>8/20/24</a:t>
             </a:fld>
             <a:endParaRPr lang="en-US"/>
           </a:p>
@@ -10139,7 +10139,7 @@
           <a:p>
             <a:fld id="{5E645A94-515A-494B-8459-6B733D537A01}" type="datetime1">
               <a:rPr lang="en-US" smtClean="0"/>
-              <a:t>8/19/24</a:t>
+              <a:t>8/20/24</a:t>
             </a:fld>
             <a:endParaRPr lang="en-US"/>
           </a:p>
@@ -10254,7 +10254,7 @@
           <a:p>
             <a:fld id="{20B3524A-7318-A944-BA8D-F1BF3E5C8B6D}" type="datetime1">
               <a:rPr lang="en-US" smtClean="0"/>
-              <a:t>8/19/24</a:t>
+              <a:t>8/20/24</a:t>
             </a:fld>
             <a:endParaRPr lang="en-US"/>
           </a:p>
@@ -10549,7 +10549,7 @@
           <a:p>
             <a:fld id="{F0CB42E9-74BD-2A4D-807D-A7E072659848}" type="datetime1">
               <a:rPr lang="en-US" smtClean="0"/>
-              <a:t>8/19/24</a:t>
+              <a:t>8/20/24</a:t>
             </a:fld>
             <a:endParaRPr lang="en-US"/>
           </a:p>
@@ -10825,7 +10825,7 @@
           <a:p>
             <a:fld id="{12621F6A-EA8C-C545-8D8E-EE14F3F0E9E8}" type="datetime1">
               <a:rPr lang="en-US" smtClean="0"/>
-              <a:t>8/19/24</a:t>
+              <a:t>8/20/24</a:t>
             </a:fld>
             <a:endParaRPr lang="en-US"/>
           </a:p>
@@ -11114,7 +11114,7 @@
           <a:p>
             <a:fld id="{DB5C3C78-45DD-7D4B-BDDA-97BD873D1A45}" type="datetime1">
               <a:rPr lang="en-US" smtClean="0"/>
-              <a:t>8/19/24</a:t>
+              <a:t>8/20/24</a:t>
             </a:fld>
             <a:endParaRPr lang="en-US"/>
           </a:p>
@@ -39939,53 +39939,14 @@
               <a:t>github</a:t>
             </a:r>
             <a:r>
-              <a:rPr lang="en-US" sz="2400" dirty="0">
+              <a:rPr lang="en-US" sz="2400">
                 <a:solidFill>
                   <a:schemeClr val="tx1"/>
                 </a:solidFill>
                 <a:sym typeface="Arial"/>
                 <a:rtl val="0"/>
               </a:rPr>
-              <a:t> repo</a:t>
-            </a:r>
-          </a:p>
-          <a:p>
-            <a:pPr marL="452438"/>
-            <a:r>
-              <a:rPr lang="en-US" sz="2400" dirty="0">
-                <a:solidFill>
-                  <a:schemeClr val="tx1"/>
-                </a:solidFill>
-                <a:latin typeface="Consolas" panose="020B0609020204030204" pitchFamily="49" charset="0"/>
-                <a:cs typeface="Consolas" panose="020B0609020204030204" pitchFamily="49" charset="0"/>
-                <a:sym typeface="Arial"/>
-                <a:rtl val="0"/>
-              </a:rPr>
-              <a:t>git clone &lt;link-to-</a:t>
-            </a:r>
-            <a:r>
-              <a:rPr lang="en-US" sz="2400" dirty="0" err="1">
-                <a:solidFill>
-                  <a:schemeClr val="tx1"/>
-                </a:solidFill>
-                <a:latin typeface="Consolas" panose="020B0609020204030204" pitchFamily="49" charset="0"/>
-                <a:cs typeface="Consolas" panose="020B0609020204030204" pitchFamily="49" charset="0"/>
-                <a:sym typeface="Arial"/>
-                <a:rtl val="0"/>
-              </a:rPr>
-              <a:t>github</a:t>
-            </a:r>
-            <a:r>
-              <a:rPr lang="en-US" sz="2400" dirty="0">
-                <a:solidFill>
-                  <a:schemeClr val="tx1"/>
-                </a:solidFill>
-                <a:latin typeface="Consolas" panose="020B0609020204030204" pitchFamily="49" charset="0"/>
-                <a:cs typeface="Consolas" panose="020B0609020204030204" pitchFamily="49" charset="0"/>
-                <a:sym typeface="Arial"/>
-                <a:rtl val="0"/>
-              </a:rPr>
-              <a:t>-repo&gt;</a:t>
+              <a:t> repo:</a:t>
             </a:r>
             <a:endParaRPr lang="en-US" sz="2400" dirty="0">
               <a:solidFill>
@@ -40002,44 +39963,32 @@
                 <a:solidFill>
                   <a:schemeClr val="tx1"/>
                 </a:solidFill>
+                <a:latin typeface="Consolas" panose="020B0609020204030204" pitchFamily="49" charset="0"/>
+                <a:cs typeface="Consolas" panose="020B0609020204030204" pitchFamily="49" charset="0"/>
                 <a:sym typeface="Arial"/>
                 <a:rtl val="0"/>
               </a:rPr>
-              <a:t>Overview of what is in the </a:t>
-            </a:r>
-            <a:r>
-              <a:rPr lang="en-US" sz="2400" dirty="0" err="1">
+              <a:t>git clone </a:t>
+            </a:r>
+            <a:r>
+              <a:rPr lang="en-US" sz="2400" dirty="0">
                 <a:solidFill>
                   <a:schemeClr val="tx1"/>
                 </a:solidFill>
+                <a:latin typeface="Consolas" panose="020B0609020204030204" pitchFamily="49" charset="0"/>
+                <a:cs typeface="Consolas" panose="020B0609020204030204" pitchFamily="49" charset="0"/>
                 <a:sym typeface="Arial"/>
+                <a:hlinkClick r:id="rId3"/>
                 <a:rtl val="0"/>
               </a:rPr>
-              <a:t>github</a:t>
-            </a:r>
-            <a:r>
-              <a:rPr lang="en-US" sz="2400" dirty="0">
-                <a:solidFill>
-                  <a:schemeClr val="tx1"/>
-                </a:solidFill>
-                <a:sym typeface="Arial"/>
-                <a:rtl val="0"/>
-              </a:rPr>
-              <a:t> repo</a:t>
-            </a:r>
-          </a:p>
-          <a:p>
-            <a:pPr>
-              <a:buFont typeface="Wingdings" panose="05000000000000000000" pitchFamily="2" charset="2"/>
-              <a:buChar char="§"/>
-            </a:pPr>
-            <a:endParaRPr lang="en-US" sz="2400" b="0" i="0" u="none" strike="noStrike" cap="none" baseline="0" dirty="0">
+              <a:t>https://github.com/chpc-uofu/slurm-lectures.git</a:t>
+            </a:r>
+            <a:endParaRPr lang="en-US" sz="2400" dirty="0">
               <a:solidFill>
                 <a:schemeClr val="tx1"/>
               </a:solidFill>
-              <a:latin typeface="Arial"/>
-              <a:ea typeface="Arial"/>
-              <a:cs typeface="Arial"/>
+              <a:latin typeface="Consolas" panose="020B0609020204030204" pitchFamily="49" charset="0"/>
+              <a:cs typeface="Consolas" panose="020B0609020204030204" pitchFamily="49" charset="0"/>
               <a:sym typeface="Arial"/>
               <a:rtl val="0"/>
             </a:endParaRPr>

</xml_diff>

<commit_message>
added link to OOD presentation
</commit_message>
<xml_diff>
--- a/running-jobs-at-chpc.pptx
+++ b/running-jobs-at-chpc.pptx
@@ -5,10 +5,10 @@
     <p:sldMasterId id="2147483818" r:id="rId1"/>
   </p:sldMasterIdLst>
   <p:notesMasterIdLst>
-    <p:notesMasterId r:id="rId56"/>
+    <p:notesMasterId r:id="rId57"/>
   </p:notesMasterIdLst>
   <p:handoutMasterIdLst>
-    <p:handoutMasterId r:id="rId57"/>
+    <p:handoutMasterId r:id="rId58"/>
   </p:handoutMasterIdLst>
   <p:sldIdLst>
     <p:sldId id="298" r:id="rId2"/>
@@ -63,8 +63,9 @@
     <p:sldId id="475" r:id="rId51"/>
     <p:sldId id="476" r:id="rId52"/>
     <p:sldId id="478" r:id="rId53"/>
-    <p:sldId id="363" r:id="rId54"/>
-    <p:sldId id="332" r:id="rId55"/>
+    <p:sldId id="482" r:id="rId54"/>
+    <p:sldId id="363" r:id="rId55"/>
+    <p:sldId id="332" r:id="rId56"/>
   </p:sldIdLst>
   <p:sldSz cx="9144000" cy="6858000" type="screen4x3"/>
   <p:notesSz cx="6985000" cy="9271000"/>
@@ -7469,7 +7470,7 @@
           <a:bodyPr/>
           <a:lstStyle/>
           <a:p>
-            <a:fld id="{63FD9185-AD24-9B42-A0B5-54F9817CCCB7}" type="datetime1">
+            <a:fld id="{EA19B2C9-D816-8745-9B75-224A39CD4194}" type="datetime1">
               <a:rPr lang="en-US" smtClean="0"/>
               <a:t>8/20/24</a:t>
             </a:fld>
@@ -7551,6 +7552,156 @@
     </p:spTree>
     <p:extLst>
       <p:ext uri="{BB962C8B-B14F-4D97-AF65-F5344CB8AC3E}">
+        <p14:creationId xmlns:p14="http://schemas.microsoft.com/office/powerpoint/2010/main" val="3862111001"/>
+      </p:ext>
+    </p:extLst>
+  </p:cSld>
+  <p:clrMapOvr>
+    <a:masterClrMapping/>
+  </p:clrMapOvr>
+</p:notes>
+</file>
+
+<file path=ppt/notesSlides/notesSlide53.xml><?xml version="1.0" encoding="utf-8"?>
+<p:notes xmlns:a="http://schemas.openxmlformats.org/drawingml/2006/main" xmlns:r="http://schemas.openxmlformats.org/officeDocument/2006/relationships" xmlns:p="http://schemas.openxmlformats.org/presentationml/2006/main">
+  <p:cSld>
+    <p:spTree>
+      <p:nvGrpSpPr>
+        <p:cNvPr id="1" name=""/>
+        <p:cNvGrpSpPr/>
+        <p:nvPr/>
+      </p:nvGrpSpPr>
+      <p:grpSpPr>
+        <a:xfrm>
+          <a:off x="0" y="0"/>
+          <a:ext cx="0" cy="0"/>
+          <a:chOff x="0" y="0"/>
+          <a:chExt cx="0" cy="0"/>
+        </a:xfrm>
+      </p:grpSpPr>
+      <p:sp>
+        <p:nvSpPr>
+          <p:cNvPr id="19458" name="Rectangle 2"/>
+          <p:cNvSpPr>
+            <a:spLocks noGrp="1" noChangeArrowheads="1"/>
+          </p:cNvSpPr>
+          <p:nvPr>
+            <p:ph type="hdr" sz="quarter"/>
+          </p:nvPr>
+        </p:nvSpPr>
+        <p:spPr>
+          <a:noFill/>
+        </p:spPr>
+        <p:txBody>
+          <a:bodyPr/>
+          <a:lstStyle/>
+          <a:p>
+            <a:r>
+              <a:rPr lang="en-US"/>
+              <a:t>http://www.chpc.utah.edu</a:t>
+            </a:r>
+          </a:p>
+        </p:txBody>
+      </p:sp>
+      <p:sp>
+        <p:nvSpPr>
+          <p:cNvPr id="19459" name="Rectangle 3"/>
+          <p:cNvSpPr>
+            <a:spLocks noGrp="1" noChangeArrowheads="1"/>
+          </p:cNvSpPr>
+          <p:nvPr>
+            <p:ph type="dt" sz="quarter" idx="1"/>
+          </p:nvPr>
+        </p:nvSpPr>
+        <p:spPr>
+          <a:noFill/>
+        </p:spPr>
+        <p:txBody>
+          <a:bodyPr/>
+          <a:lstStyle/>
+          <a:p>
+            <a:fld id="{63FD9185-AD24-9B42-A0B5-54F9817CCCB7}" type="datetime1">
+              <a:rPr lang="en-US" smtClean="0"/>
+              <a:t>8/20/24</a:t>
+            </a:fld>
+            <a:endParaRPr lang="en-US"/>
+          </a:p>
+        </p:txBody>
+      </p:sp>
+      <p:sp>
+        <p:nvSpPr>
+          <p:cNvPr id="19460" name="Rectangle 7"/>
+          <p:cNvSpPr>
+            <a:spLocks noGrp="1" noChangeArrowheads="1"/>
+          </p:cNvSpPr>
+          <p:nvPr>
+            <p:ph type="sldNum" sz="quarter" idx="5"/>
+          </p:nvPr>
+        </p:nvSpPr>
+        <p:spPr>
+          <a:noFill/>
+        </p:spPr>
+        <p:txBody>
+          <a:bodyPr/>
+          <a:lstStyle/>
+          <a:p>
+            <a:fld id="{592D9234-6126-A744-9630-0322AA72A86E}" type="slidenum">
+              <a:rPr lang="en-US"/>
+              <a:pPr/>
+              <a:t>53</a:t>
+            </a:fld>
+            <a:endParaRPr lang="en-US"/>
+          </a:p>
+        </p:txBody>
+      </p:sp>
+      <p:sp>
+        <p:nvSpPr>
+          <p:cNvPr id="19461" name="Rectangle 2"/>
+          <p:cNvSpPr>
+            <a:spLocks noGrp="1" noRot="1" noChangeAspect="1" noChangeArrowheads="1" noTextEdit="1"/>
+          </p:cNvSpPr>
+          <p:nvPr>
+            <p:ph type="sldImg"/>
+          </p:nvPr>
+        </p:nvSpPr>
+        <p:spPr>
+          <a:ln/>
+        </p:spPr>
+      </p:sp>
+      <p:sp>
+        <p:nvSpPr>
+          <p:cNvPr id="19462" name="Rectangle 3"/>
+          <p:cNvSpPr>
+            <a:spLocks noGrp="1" noChangeArrowheads="1"/>
+          </p:cNvSpPr>
+          <p:nvPr>
+            <p:ph type="body" idx="1"/>
+          </p:nvPr>
+        </p:nvSpPr>
+        <p:spPr>
+          <a:xfrm>
+            <a:off x="931863" y="4403725"/>
+            <a:ext cx="5121275" cy="274638"/>
+          </a:xfrm>
+          <a:noFill/>
+          <a:ln/>
+        </p:spPr>
+        <p:txBody>
+          <a:bodyPr/>
+          <a:lstStyle/>
+          <a:p>
+            <a:pPr eaLnBrk="1" hangingPunct="1"/>
+            <a:endParaRPr lang="en-US">
+              <a:latin typeface="Times" pitchFamily="26" charset="0"/>
+              <a:ea typeface="ＭＳ Ｐゴシック" pitchFamily="26" charset="-128"/>
+              <a:cs typeface="ＭＳ Ｐゴシック" pitchFamily="26" charset="-128"/>
+            </a:endParaRPr>
+          </a:p>
+        </p:txBody>
+      </p:sp>
+    </p:spTree>
+    <p:extLst>
+      <p:ext uri="{BB962C8B-B14F-4D97-AF65-F5344CB8AC3E}">
         <p14:creationId xmlns:p14="http://schemas.microsoft.com/office/powerpoint/2010/main" val="3712544461"/>
       </p:ext>
     </p:extLst>
@@ -7561,7 +7712,7 @@
 </p:notes>
 </file>
 
-<file path=ppt/notesSlides/notesSlide53.xml><?xml version="1.0" encoding="utf-8"?>
+<file path=ppt/notesSlides/notesSlide54.xml><?xml version="1.0" encoding="utf-8"?>
 <p:notes xmlns:a="http://schemas.openxmlformats.org/drawingml/2006/main" xmlns:r="http://schemas.openxmlformats.org/officeDocument/2006/relationships" xmlns:p="http://schemas.openxmlformats.org/presentationml/2006/main">
   <p:cSld>
     <p:spTree>
@@ -7647,7 +7798,7 @@
             <a:fld id="{1C82E5BE-70E8-8441-A6F4-873B0B87C89F}" type="slidenum">
               <a:rPr lang="en-US"/>
               <a:pPr/>
-              <a:t>53</a:t>
+              <a:t>54</a:t>
             </a:fld>
             <a:endParaRPr lang="en-US"/>
           </a:p>
@@ -46909,6 +47060,140 @@
         </p:nvSpPr>
         <p:spPr>
           <a:xfrm>
+            <a:off x="252523" y="1147762"/>
+            <a:ext cx="8638954" cy="762000"/>
+          </a:xfrm>
+        </p:spPr>
+        <p:txBody>
+          <a:bodyPr/>
+          <a:lstStyle/>
+          <a:p>
+            <a:pPr algn="ctr" eaLnBrk="1" hangingPunct="1"/>
+            <a:r>
+              <a:rPr lang="en-US" sz="4000" b="1" dirty="0">
+                <a:solidFill>
+                  <a:srgbClr val="990000"/>
+                </a:solidFill>
+                <a:latin typeface="+mn-lt"/>
+              </a:rPr>
+              <a:t>Hands On #4: Open OnDemand</a:t>
+            </a:r>
+          </a:p>
+        </p:txBody>
+      </p:sp>
+      <p:sp>
+        <p:nvSpPr>
+          <p:cNvPr id="18435" name="Rectangle 3"/>
+          <p:cNvSpPr>
+            <a:spLocks noGrp="1" noChangeArrowheads="1"/>
+          </p:cNvSpPr>
+          <p:nvPr>
+            <p:ph idx="1"/>
+          </p:nvPr>
+        </p:nvSpPr>
+        <p:spPr>
+          <a:xfrm>
+            <a:off x="47846" y="1909762"/>
+            <a:ext cx="9048308" cy="4876800"/>
+          </a:xfrm>
+        </p:spPr>
+        <p:txBody>
+          <a:bodyPr/>
+          <a:lstStyle/>
+          <a:p>
+            <a:r>
+              <a:rPr lang="en-US" sz="2400" dirty="0"/>
+              <a:t>Interested in learning more about Open OnDemand?</a:t>
+            </a:r>
+          </a:p>
+          <a:p>
+            <a:r>
+              <a:rPr lang="en-US" sz="2400" dirty="0"/>
+              <a:t>We give presentations on it every semester.</a:t>
+            </a:r>
+          </a:p>
+          <a:p>
+            <a:r>
+              <a:rPr lang="en-US" sz="2400" dirty="0"/>
+              <a:t>You can find slides and information here: </a:t>
+            </a:r>
+            <a:r>
+              <a:rPr lang="en-US" sz="2400" dirty="0">
+                <a:hlinkClick r:id="rId3"/>
+              </a:rPr>
+              <a:t>https://www.chpc.utah.edu/presentations/OpenOnDemand.php</a:t>
+            </a:r>
+            <a:endParaRPr lang="en-US" sz="2400"/>
+          </a:p>
+          <a:p>
+            <a:pPr marL="0" indent="0">
+              <a:buNone/>
+            </a:pPr>
+            <a:endParaRPr lang="en-US" sz="2400" dirty="0"/>
+          </a:p>
+          <a:p>
+            <a:endParaRPr lang="en-US" sz="2400" dirty="0"/>
+          </a:p>
+          <a:p>
+            <a:endParaRPr lang="en-US" sz="2000" dirty="0"/>
+          </a:p>
+          <a:p>
+            <a:pPr lvl="1"/>
+            <a:endParaRPr lang="en-US" sz="2000" dirty="0"/>
+          </a:p>
+          <a:p>
+            <a:pPr lvl="1"/>
+            <a:endParaRPr lang="en-US" sz="2000" dirty="0"/>
+          </a:p>
+          <a:p>
+            <a:pPr lvl="1"/>
+            <a:endParaRPr lang="en-US" sz="2000" dirty="0"/>
+          </a:p>
+        </p:txBody>
+      </p:sp>
+    </p:spTree>
+    <p:extLst>
+      <p:ext uri="{BB962C8B-B14F-4D97-AF65-F5344CB8AC3E}">
+        <p14:creationId xmlns:p14="http://schemas.microsoft.com/office/powerpoint/2010/main" val="1928656804"/>
+      </p:ext>
+    </p:extLst>
+  </p:cSld>
+  <p:clrMapOvr>
+    <a:masterClrMapping/>
+  </p:clrMapOvr>
+  <p:transition/>
+</p:sld>
+</file>
+
+<file path=ppt/slides/slide54.xml><?xml version="1.0" encoding="utf-8"?>
+<p:sld xmlns:a="http://schemas.openxmlformats.org/drawingml/2006/main" xmlns:r="http://schemas.openxmlformats.org/officeDocument/2006/relationships" xmlns:p="http://schemas.openxmlformats.org/presentationml/2006/main">
+  <p:cSld>
+    <p:spTree>
+      <p:nvGrpSpPr>
+        <p:cNvPr id="1" name=""/>
+        <p:cNvGrpSpPr/>
+        <p:nvPr/>
+      </p:nvGrpSpPr>
+      <p:grpSpPr>
+        <a:xfrm>
+          <a:off x="0" y="0"/>
+          <a:ext cx="0" cy="0"/>
+          <a:chOff x="0" y="0"/>
+          <a:chExt cx="0" cy="0"/>
+        </a:xfrm>
+      </p:grpSpPr>
+      <p:sp>
+        <p:nvSpPr>
+          <p:cNvPr id="18434" name="Rectangle 2"/>
+          <p:cNvSpPr>
+            <a:spLocks noGrp="1" noChangeArrowheads="1"/>
+          </p:cNvSpPr>
+          <p:nvPr>
+            <p:ph type="title"/>
+          </p:nvPr>
+        </p:nvSpPr>
+        <p:spPr>
+          <a:xfrm>
             <a:off x="457200" y="1143000"/>
             <a:ext cx="8153400" cy="762000"/>
           </a:xfrm>
@@ -47104,7 +47389,7 @@
 </p:sld>
 </file>
 
-<file path=ppt/slides/slide54.xml><?xml version="1.0" encoding="utf-8"?>
+<file path=ppt/slides/slide55.xml><?xml version="1.0" encoding="utf-8"?>
 <p:sld xmlns:a="http://schemas.openxmlformats.org/drawingml/2006/main" xmlns:r="http://schemas.openxmlformats.org/officeDocument/2006/relationships" xmlns:p="http://schemas.openxmlformats.org/presentationml/2006/main">
   <p:cSld>
     <p:spTree>

</xml_diff>

<commit_message>
changed hands-on 1 cluster to notchpeak
</commit_message>
<xml_diff>
--- a/running-jobs-at-chpc.pptx
+++ b/running-jobs-at-chpc.pptx
@@ -337,7 +337,7 @@
           <a:p>
             <a:fld id="{62E2CED9-D5BD-3644-8475-2841E9D82073}" type="datetime1">
               <a:rPr lang="en-US" smtClean="0"/>
-              <a:t>8/20/24</a:t>
+              <a:t>8/27/24</a:t>
             </a:fld>
             <a:endParaRPr lang="en-US"/>
           </a:p>
@@ -582,7 +582,7 @@
           <a:p>
             <a:fld id="{31221515-87E2-7C40-8A70-6FFA423A8160}" type="datetime1">
               <a:rPr lang="en-US" smtClean="0"/>
-              <a:t>8/20/24</a:t>
+              <a:t>8/27/24</a:t>
             </a:fld>
             <a:endParaRPr lang="en-US"/>
           </a:p>
@@ -1089,7 +1089,7 @@
           <a:p>
             <a:fld id="{2BB4CB58-B347-5B4D-9C8E-5A887AD7F3E7}" type="datetime1">
               <a:rPr lang="en-US" smtClean="0"/>
-              <a:t>8/20/24</a:t>
+              <a:t>8/27/24</a:t>
             </a:fld>
             <a:endParaRPr lang="en-US"/>
           </a:p>
@@ -1272,7 +1272,7 @@
           <a:p>
             <a:fld id="{6D1C50CE-E2FB-F04B-AEA0-39B24230EA52}" type="datetime1">
               <a:rPr lang="en-US" smtClean="0"/>
-              <a:t>8/20/24</a:t>
+              <a:t>8/27/24</a:t>
             </a:fld>
             <a:endParaRPr lang="en-US"/>
           </a:p>
@@ -1375,7 +1375,7 @@
           <a:p>
             <a:fld id="{2BB4CB58-B347-5B4D-9C8E-5A887AD7F3E7}" type="datetime1">
               <a:rPr lang="en-US" smtClean="0"/>
-              <a:t>8/20/24</a:t>
+              <a:t>8/27/24</a:t>
             </a:fld>
             <a:endParaRPr lang="en-US"/>
           </a:p>
@@ -1525,7 +1525,7 @@
           <a:p>
             <a:fld id="{2BB4CB58-B347-5B4D-9C8E-5A887AD7F3E7}" type="datetime1">
               <a:rPr lang="en-US" smtClean="0"/>
-              <a:t>8/20/24</a:t>
+              <a:t>8/27/24</a:t>
             </a:fld>
             <a:endParaRPr lang="en-US"/>
           </a:p>
@@ -1675,7 +1675,7 @@
           <a:p>
             <a:fld id="{2BB4CB58-B347-5B4D-9C8E-5A887AD7F3E7}" type="datetime1">
               <a:rPr lang="en-US" smtClean="0"/>
-              <a:t>8/20/24</a:t>
+              <a:t>8/27/24</a:t>
             </a:fld>
             <a:endParaRPr lang="en-US"/>
           </a:p>
@@ -1825,7 +1825,7 @@
           <a:p>
             <a:fld id="{2BB4CB58-B347-5B4D-9C8E-5A887AD7F3E7}" type="datetime1">
               <a:rPr lang="en-US" smtClean="0"/>
-              <a:t>8/20/24</a:t>
+              <a:t>8/27/24</a:t>
             </a:fld>
             <a:endParaRPr lang="en-US"/>
           </a:p>
@@ -1975,7 +1975,7 @@
           <a:p>
             <a:fld id="{2BB4CB58-B347-5B4D-9C8E-5A887AD7F3E7}" type="datetime1">
               <a:rPr lang="en-US" smtClean="0"/>
-              <a:t>8/20/24</a:t>
+              <a:t>8/27/24</a:t>
             </a:fld>
             <a:endParaRPr lang="en-US"/>
           </a:p>
@@ -2125,7 +2125,7 @@
           <a:p>
             <a:fld id="{2BB4CB58-B347-5B4D-9C8E-5A887AD7F3E7}" type="datetime1">
               <a:rPr lang="en-US" smtClean="0"/>
-              <a:t>8/20/24</a:t>
+              <a:t>8/27/24</a:t>
             </a:fld>
             <a:endParaRPr lang="en-US"/>
           </a:p>
@@ -2275,7 +2275,7 @@
           <a:p>
             <a:fld id="{2BB4CB58-B347-5B4D-9C8E-5A887AD7F3E7}" type="datetime1">
               <a:rPr lang="en-US" smtClean="0"/>
-              <a:t>8/20/24</a:t>
+              <a:t>8/27/24</a:t>
             </a:fld>
             <a:endParaRPr lang="en-US"/>
           </a:p>
@@ -2425,7 +2425,7 @@
           <a:p>
             <a:fld id="{2BB4CB58-B347-5B4D-9C8E-5A887AD7F3E7}" type="datetime1">
               <a:rPr lang="en-US" smtClean="0"/>
-              <a:t>8/20/24</a:t>
+              <a:t>8/27/24</a:t>
             </a:fld>
             <a:endParaRPr lang="en-US"/>
           </a:p>
@@ -2683,7 +2683,7 @@
           <a:p>
             <a:fld id="{2BB4CB58-B347-5B4D-9C8E-5A887AD7F3E7}" type="datetime1">
               <a:rPr lang="en-US" smtClean="0"/>
-              <a:t>8/20/24</a:t>
+              <a:t>8/27/24</a:t>
             </a:fld>
             <a:endParaRPr lang="en-US"/>
           </a:p>
@@ -2876,7 +2876,7 @@
           <a:p>
             <a:fld id="{731A72B3-DD96-E04B-8B14-D43AA4AE89BB}" type="datetime1">
               <a:rPr lang="en-US" smtClean="0"/>
-              <a:t>8/20/24</a:t>
+              <a:t>8/27/24</a:t>
             </a:fld>
             <a:endParaRPr lang="en-US"/>
           </a:p>
@@ -3085,7 +3085,7 @@
           <a:p>
             <a:fld id="{2BB4CB58-B347-5B4D-9C8E-5A887AD7F3E7}" type="datetime1">
               <a:rPr lang="en-US" smtClean="0"/>
-              <a:t>8/20/24</a:t>
+              <a:t>8/27/24</a:t>
             </a:fld>
             <a:endParaRPr lang="en-US"/>
           </a:p>
@@ -3260,7 +3260,7 @@
           <a:p>
             <a:fld id="{2BB4CB58-B347-5B4D-9C8E-5A887AD7F3E7}" type="datetime1">
               <a:rPr lang="en-US" smtClean="0"/>
-              <a:t>8/20/24</a:t>
+              <a:t>8/27/24</a:t>
             </a:fld>
             <a:endParaRPr lang="en-US"/>
           </a:p>
@@ -3410,7 +3410,7 @@
           <a:p>
             <a:fld id="{2BB4CB58-B347-5B4D-9C8E-5A887AD7F3E7}" type="datetime1">
               <a:rPr lang="en-US" smtClean="0"/>
-              <a:t>8/20/24</a:t>
+              <a:t>8/27/24</a:t>
             </a:fld>
             <a:endParaRPr lang="en-US"/>
           </a:p>
@@ -3563,7 +3563,7 @@
           <a:p>
             <a:fld id="{2BB4CB58-B347-5B4D-9C8E-5A887AD7F3E7}" type="datetime1">
               <a:rPr lang="en-US" smtClean="0"/>
-              <a:t>8/20/24</a:t>
+              <a:t>8/27/24</a:t>
             </a:fld>
             <a:endParaRPr lang="en-US"/>
           </a:p>
@@ -3732,7 +3732,7 @@
           <a:p>
             <a:fld id="{2BB4CB58-B347-5B4D-9C8E-5A887AD7F3E7}" type="datetime1">
               <a:rPr lang="en-US" smtClean="0"/>
-              <a:t>8/20/24</a:t>
+              <a:t>8/27/24</a:t>
             </a:fld>
             <a:endParaRPr lang="en-US"/>
           </a:p>
@@ -3896,7 +3896,7 @@
           <a:p>
             <a:fld id="{2BB4CB58-B347-5B4D-9C8E-5A887AD7F3E7}" type="datetime1">
               <a:rPr lang="en-US" smtClean="0"/>
-              <a:t>8/20/24</a:t>
+              <a:t>8/27/24</a:t>
             </a:fld>
             <a:endParaRPr lang="en-US"/>
           </a:p>
@@ -4089,7 +4089,7 @@
           <a:p>
             <a:fld id="{6C81A55C-D3F3-414F-ACAE-23B92BAD237C}" type="datetime1">
               <a:rPr lang="en-US" smtClean="0"/>
-              <a:t>8/20/24</a:t>
+              <a:t>8/27/24</a:t>
             </a:fld>
             <a:endParaRPr lang="en-US"/>
           </a:p>
@@ -4222,7 +4222,7 @@
           <a:p>
             <a:fld id="{6C81A55C-D3F3-414F-ACAE-23B92BAD237C}" type="datetime1">
               <a:rPr lang="en-US" smtClean="0"/>
-              <a:t>8/20/24</a:t>
+              <a:t>8/27/24</a:t>
             </a:fld>
             <a:endParaRPr lang="en-US"/>
           </a:p>
@@ -4325,7 +4325,7 @@
           <a:p>
             <a:fld id="{279B7796-27FF-2447-A144-C38BBB0049E9}" type="datetime1">
               <a:rPr lang="en-US" smtClean="0"/>
-              <a:t>8/20/24</a:t>
+              <a:t>8/27/24</a:t>
             </a:fld>
             <a:endParaRPr lang="en-US"/>
           </a:p>
@@ -4502,7 +4502,7 @@
           <a:p>
             <a:fld id="{6C81A55C-D3F3-414F-ACAE-23B92BAD237C}" type="datetime1">
               <a:rPr lang="en-US" smtClean="0"/>
-              <a:t>8/20/24</a:t>
+              <a:t>8/27/24</a:t>
             </a:fld>
             <a:endParaRPr lang="en-US"/>
           </a:p>
@@ -5604,7 +5604,7 @@
           <a:p>
             <a:fld id="{6D1C50CE-E2FB-F04B-AEA0-39B24230EA52}" type="datetime1">
               <a:rPr lang="en-US" smtClean="0"/>
-              <a:t>8/20/24</a:t>
+              <a:t>8/27/24</a:t>
             </a:fld>
             <a:endParaRPr lang="en-US"/>
           </a:p>
@@ -6031,7 +6031,7 @@
           <a:p>
             <a:fld id="{EA19B2C9-D816-8745-9B75-224A39CD4194}" type="datetime1">
               <a:rPr lang="en-US" smtClean="0"/>
-              <a:t>8/20/24</a:t>
+              <a:t>8/27/24</a:t>
             </a:fld>
             <a:endParaRPr lang="en-US"/>
           </a:p>
@@ -6181,7 +6181,7 @@
           <a:p>
             <a:fld id="{EA19B2C9-D816-8745-9B75-224A39CD4194}" type="datetime1">
               <a:rPr lang="en-US" smtClean="0"/>
-              <a:t>8/20/24</a:t>
+              <a:t>8/27/24</a:t>
             </a:fld>
             <a:endParaRPr lang="en-US"/>
           </a:p>
@@ -6331,7 +6331,7 @@
           <a:p>
             <a:fld id="{EA19B2C9-D816-8745-9B75-224A39CD4194}" type="datetime1">
               <a:rPr lang="en-US" smtClean="0"/>
-              <a:t>8/20/24</a:t>
+              <a:t>8/27/24</a:t>
             </a:fld>
             <a:endParaRPr lang="en-US"/>
           </a:p>
@@ -6481,7 +6481,7 @@
           <a:p>
             <a:fld id="{EA19B2C9-D816-8745-9B75-224A39CD4194}" type="datetime1">
               <a:rPr lang="en-US" smtClean="0"/>
-              <a:t>8/20/24</a:t>
+              <a:t>8/27/24</a:t>
             </a:fld>
             <a:endParaRPr lang="en-US"/>
           </a:p>
@@ -6631,7 +6631,7 @@
           <a:p>
             <a:fld id="{EA19B2C9-D816-8745-9B75-224A39CD4194}" type="datetime1">
               <a:rPr lang="en-US" smtClean="0"/>
-              <a:t>8/20/24</a:t>
+              <a:t>8/27/24</a:t>
             </a:fld>
             <a:endParaRPr lang="en-US"/>
           </a:p>
@@ -6889,7 +6889,7 @@
           <a:p>
             <a:fld id="{EA19B2C9-D816-8745-9B75-224A39CD4194}" type="datetime1">
               <a:rPr lang="en-US" smtClean="0"/>
-              <a:t>8/20/24</a:t>
+              <a:t>8/27/24</a:t>
             </a:fld>
             <a:endParaRPr lang="en-US"/>
           </a:p>
@@ -7069,7 +7069,7 @@
           <a:p>
             <a:fld id="{6D1C50CE-E2FB-F04B-AEA0-39B24230EA52}" type="datetime1">
               <a:rPr lang="en-US" smtClean="0"/>
-              <a:t>8/20/24</a:t>
+              <a:t>8/27/24</a:t>
             </a:fld>
             <a:endParaRPr lang="en-US"/>
           </a:p>
@@ -7172,7 +7172,7 @@
           <a:p>
             <a:fld id="{EA19B2C9-D816-8745-9B75-224A39CD4194}" type="datetime1">
               <a:rPr lang="en-US" smtClean="0"/>
-              <a:t>8/20/24</a:t>
+              <a:t>8/27/24</a:t>
             </a:fld>
             <a:endParaRPr lang="en-US"/>
           </a:p>
@@ -7322,7 +7322,7 @@
           <a:p>
             <a:fld id="{EA19B2C9-D816-8745-9B75-224A39CD4194}" type="datetime1">
               <a:rPr lang="en-US" smtClean="0"/>
-              <a:t>8/20/24</a:t>
+              <a:t>8/27/24</a:t>
             </a:fld>
             <a:endParaRPr lang="en-US"/>
           </a:p>
@@ -7472,7 +7472,7 @@
           <a:p>
             <a:fld id="{EA19B2C9-D816-8745-9B75-224A39CD4194}" type="datetime1">
               <a:rPr lang="en-US" smtClean="0"/>
-              <a:t>8/20/24</a:t>
+              <a:t>8/27/24</a:t>
             </a:fld>
             <a:endParaRPr lang="en-US"/>
           </a:p>
@@ -7622,7 +7622,7 @@
           <a:p>
             <a:fld id="{63FD9185-AD24-9B42-A0B5-54F9817CCCB7}" type="datetime1">
               <a:rPr lang="en-US" smtClean="0"/>
-              <a:t>8/20/24</a:t>
+              <a:t>8/27/24</a:t>
             </a:fld>
             <a:endParaRPr lang="en-US"/>
           </a:p>
@@ -7772,7 +7772,7 @@
           <a:p>
             <a:fld id="{FCD69FAF-FB69-C34E-8B9C-EFFFE36E46A2}" type="datetime1">
               <a:rPr lang="en-US" smtClean="0"/>
-              <a:t>8/20/24</a:t>
+              <a:t>8/27/24</a:t>
             </a:fld>
             <a:endParaRPr lang="en-US"/>
           </a:p>
@@ -7958,7 +7958,7 @@
           <a:p>
             <a:fld id="{31221515-87E2-7C40-8A70-6FFA423A8160}" type="datetime1">
               <a:rPr lang="en-US" smtClean="0"/>
-              <a:t>8/20/24</a:t>
+              <a:t>8/27/24</a:t>
             </a:fld>
             <a:endParaRPr lang="en-US"/>
           </a:p>
@@ -8091,7 +8091,7 @@
           <a:p>
             <a:fld id="{31221515-87E2-7C40-8A70-6FFA423A8160}" type="datetime1">
               <a:rPr lang="en-US" smtClean="0"/>
-              <a:t>8/20/24</a:t>
+              <a:t>8/27/24</a:t>
             </a:fld>
             <a:endParaRPr lang="en-US"/>
           </a:p>
@@ -8302,7 +8302,7 @@
           <a:p>
             <a:fld id="{2BB4CB58-B347-5B4D-9C8E-5A887AD7F3E7}" type="datetime1">
               <a:rPr lang="en-US" smtClean="0"/>
-              <a:t>8/20/24</a:t>
+              <a:t>8/27/24</a:t>
             </a:fld>
             <a:endParaRPr lang="en-US"/>
           </a:p>
@@ -8609,7 +8609,7 @@
           <a:p>
             <a:fld id="{55D5EE7A-2F0B-F045-A3C5-943ACEC06F73}" type="datetime1">
               <a:rPr lang="en-US" smtClean="0"/>
-              <a:t>8/20/24</a:t>
+              <a:t>8/27/24</a:t>
             </a:fld>
             <a:endParaRPr lang="en-US"/>
           </a:p>
@@ -8807,7 +8807,7 @@
           <a:p>
             <a:fld id="{085B8D5C-F4EF-B649-B365-9A4DB83B2496}" type="datetime1">
               <a:rPr lang="en-US" smtClean="0"/>
-              <a:t>8/20/24</a:t>
+              <a:t>8/27/24</a:t>
             </a:fld>
             <a:endParaRPr lang="en-US"/>
           </a:p>
@@ -9005,7 +9005,7 @@
           <a:p>
             <a:fld id="{3DA9B093-FC82-AE41-AF04-D2D7DA79C7A2}" type="datetime1">
               <a:rPr lang="en-US" smtClean="0"/>
-              <a:t>8/20/24</a:t>
+              <a:t>8/27/24</a:t>
             </a:fld>
             <a:endParaRPr lang="en-US"/>
           </a:p>
@@ -9193,7 +9193,7 @@
           <a:p>
             <a:fld id="{8DF81612-102D-4C42-A0F0-339BF18A2360}" type="datetime1">
               <a:rPr lang="en-US" smtClean="0"/>
-              <a:t>8/20/24</a:t>
+              <a:t>8/27/24</a:t>
             </a:fld>
             <a:endParaRPr lang="en-US"/>
           </a:p>
@@ -9404,7 +9404,7 @@
           <a:p>
             <a:fld id="{3E98D671-C5DA-AF46-84EF-749DA99440AB}" type="datetime1">
               <a:rPr lang="en-US" smtClean="0"/>
-              <a:t>8/20/24</a:t>
+              <a:t>8/27/24</a:t>
             </a:fld>
             <a:endParaRPr lang="en-US"/>
           </a:p>
@@ -9709,7 +9709,7 @@
           <a:p>
             <a:fld id="{95C48D57-3857-6F44-9A5B-F3531645B419}" type="datetime1">
               <a:rPr lang="en-US" smtClean="0"/>
-              <a:t>8/20/24</a:t>
+              <a:t>8/27/24</a:t>
             </a:fld>
             <a:endParaRPr lang="en-US"/>
           </a:p>
@@ -10153,7 +10153,7 @@
           <a:p>
             <a:fld id="{D7B5D516-3E61-FC47-B3EE-AEB5B493CC2D}" type="datetime1">
               <a:rPr lang="en-US" smtClean="0"/>
-              <a:t>8/20/24</a:t>
+              <a:t>8/27/24</a:t>
             </a:fld>
             <a:endParaRPr lang="en-US"/>
           </a:p>
@@ -10290,7 +10290,7 @@
           <a:p>
             <a:fld id="{5E645A94-515A-494B-8459-6B733D537A01}" type="datetime1">
               <a:rPr lang="en-US" smtClean="0"/>
-              <a:t>8/20/24</a:t>
+              <a:t>8/27/24</a:t>
             </a:fld>
             <a:endParaRPr lang="en-US"/>
           </a:p>
@@ -10405,7 +10405,7 @@
           <a:p>
             <a:fld id="{20B3524A-7318-A944-BA8D-F1BF3E5C8B6D}" type="datetime1">
               <a:rPr lang="en-US" smtClean="0"/>
-              <a:t>8/20/24</a:t>
+              <a:t>8/27/24</a:t>
             </a:fld>
             <a:endParaRPr lang="en-US"/>
           </a:p>
@@ -10700,7 +10700,7 @@
           <a:p>
             <a:fld id="{F0CB42E9-74BD-2A4D-807D-A7E072659848}" type="datetime1">
               <a:rPr lang="en-US" smtClean="0"/>
-              <a:t>8/20/24</a:t>
+              <a:t>8/27/24</a:t>
             </a:fld>
             <a:endParaRPr lang="en-US"/>
           </a:p>
@@ -10976,7 +10976,7 @@
           <a:p>
             <a:fld id="{12621F6A-EA8C-C545-8D8E-EE14F3F0E9E8}" type="datetime1">
               <a:rPr lang="en-US" smtClean="0"/>
-              <a:t>8/20/24</a:t>
+              <a:t>8/27/24</a:t>
             </a:fld>
             <a:endParaRPr lang="en-US"/>
           </a:p>
@@ -11265,7 +11265,7 @@
           <a:p>
             <a:fld id="{DB5C3C78-45DD-7D4B-BDDA-97BD873D1A45}" type="datetime1">
               <a:rPr lang="en-US" smtClean="0"/>
-              <a:t>8/20/24</a:t>
+              <a:t>8/27/24</a:t>
             </a:fld>
             <a:endParaRPr lang="en-US"/>
           </a:p>
@@ -24865,7 +24865,7 @@
                 <a:sym typeface="Arial"/>
                 <a:rtl val="0"/>
               </a:rPr>
-              <a:t>Kingspeak</a:t>
+              <a:t>Notchpeak</a:t>
             </a:r>
             <a:r>
               <a:rPr lang="en-US" sz="2000" dirty="0">
@@ -38748,7 +38748,7 @@
                 <a:sym typeface="Arial"/>
                 <a:rtl val="0"/>
               </a:rPr>
-              <a:t>Kingspeak</a:t>
+              <a:t>Notchpeak</a:t>
             </a:r>
             <a:r>
               <a:rPr lang="en-US" sz="2000" dirty="0">
@@ -39880,7 +39880,7 @@
                 <a:sym typeface="Arial"/>
                 <a:rtl val="0"/>
               </a:rPr>
-              <a:t>Kingspeak</a:t>
+              <a:t>Notchpeak</a:t>
             </a:r>
             <a:r>
               <a:rPr lang="en-US" sz="2000" dirty="0">
@@ -40384,7 +40384,7 @@
                 <a:sym typeface="Arial"/>
                 <a:rtl val="0"/>
               </a:rPr>
-              <a:t>Kingspeak</a:t>
+              <a:t>Notchpeak</a:t>
             </a:r>
             <a:r>
               <a:rPr lang="en-US" sz="2000" dirty="0">
@@ -41428,7 +41428,7 @@
                 <a:sym typeface="Arial"/>
                 <a:rtl val="0"/>
               </a:rPr>
-              <a:t>Kingspeak</a:t>
+              <a:t>Notchpeak</a:t>
             </a:r>
             <a:r>
               <a:rPr lang="en-US" sz="2000" dirty="0">
@@ -41720,7 +41720,7 @@
                 <a:sym typeface="Arial"/>
                 <a:rtl val="0"/>
               </a:rPr>
-              <a:t>Kingspeak</a:t>
+              <a:t>Notchpeak</a:t>
             </a:r>
             <a:r>
               <a:rPr lang="en-US" sz="2000" dirty="0">
@@ -42020,7 +42020,7 @@
                 <a:sym typeface="Arial"/>
                 <a:rtl val="0"/>
               </a:rPr>
-              <a:t>Kingspeak’s</a:t>
+              <a:t>Notchpeak’s</a:t>
             </a:r>
             <a:r>
               <a:rPr lang="en-US" sz="2000" b="1" dirty="0">
@@ -42030,7 +42030,7 @@
                 <a:sym typeface="Arial"/>
                 <a:rtl val="0"/>
               </a:rPr>
-              <a:t> shared partition</a:t>
+              <a:t> shared-short partition</a:t>
             </a:r>
           </a:p>
           <a:p>
@@ -42642,7 +42642,7 @@
                 <a:sym typeface="Arial"/>
                 <a:rtl val="0"/>
               </a:rPr>
-              <a:t>Kingspeak</a:t>
+              <a:t>Notchpeak</a:t>
             </a:r>
             <a:r>
               <a:rPr lang="en-US" sz="2000" dirty="0">
@@ -42962,7 +42962,7 @@
                 <a:sym typeface="Arial"/>
                 <a:rtl val="0"/>
               </a:rPr>
-              <a:t>Kingspeak</a:t>
+              <a:t>Notchpeak</a:t>
             </a:r>
             <a:endParaRPr lang="en-US" sz="2000" dirty="0">
               <a:solidFill>
@@ -43388,7 +43388,7 @@
                 <a:sym typeface="Arial"/>
                 <a:rtl val="0"/>
               </a:rPr>
-              <a:t>Kingspeak</a:t>
+              <a:t>Notchpeak</a:t>
             </a:r>
             <a:endParaRPr lang="en-US" sz="2000" u="sng" dirty="0">
               <a:solidFill>
@@ -43786,7 +43786,7 @@
                 <a:sym typeface="Arial"/>
                 <a:rtl val="0"/>
               </a:rPr>
-              <a:t>Kingspeak</a:t>
+              <a:t>Notchpeak</a:t>
             </a:r>
             <a:r>
               <a:rPr lang="en-US" sz="2000" dirty="0">
@@ -44193,11 +44193,11 @@
             <a:pPr lvl="1"/>
             <a:r>
               <a:rPr lang="en-US" sz="2400" b="1" dirty="0" err="1"/>
-              <a:t>kingspeak</a:t>
+              <a:t>Notchpeak</a:t>
             </a:r>
             <a:r>
               <a:rPr lang="en-US" sz="2400" b="1" dirty="0"/>
-              <a:t>-shared</a:t>
+              <a:t>-shared-short</a:t>
             </a:r>
             <a:r>
               <a:rPr lang="en-US" sz="2400" dirty="0"/>
@@ -46072,7 +46072,7 @@
                 <a:sym typeface="Arial"/>
                 <a:rtl val="0"/>
               </a:rPr>
-              <a:t>Kingspeak</a:t>
+              <a:t>Notchpeak</a:t>
             </a:r>
             <a:r>
               <a:rPr lang="en-US" sz="2000" dirty="0">
@@ -50470,7 +50470,7 @@
                 <a:sym typeface="Arial"/>
                 <a:rtl val="0"/>
               </a:rPr>
-              <a:t>Kingspeak</a:t>
+              <a:t>Notchpeak</a:t>
             </a:r>
             <a:r>
               <a:rPr lang="en-US" sz="2000" dirty="0">

</xml_diff>